<commit_message>
added aria labels to improve lighthouse score, closesincrease ARIA accessibility #142
</commit_message>
<xml_diff>
--- a/IS601_Expeditions-deli.pptx
+++ b/IS601_Expeditions-deli.pptx
@@ -137,7 +137,7 @@
   <pc:docChgLst>
     <pc:chgData name="Thomas Byrne" userId="f88fd6c5ab659097" providerId="LiveId" clId="{C564171C-A25D-42CC-9769-E5B6122DD44C}"/>
     <pc:docChg chg="undo redo custSel addSld delSld modSld sldOrd">
-      <pc:chgData name="Thomas Byrne" userId="f88fd6c5ab659097" providerId="LiveId" clId="{C564171C-A25D-42CC-9769-E5B6122DD44C}" dt="2023-12-17T22:49:26.793" v="5310" actId="207"/>
+      <pc:chgData name="Thomas Byrne" userId="f88fd6c5ab659097" providerId="LiveId" clId="{C564171C-A25D-42CC-9769-E5B6122DD44C}" dt="2023-12-17T23:12:00.511" v="5322" actId="1076"/>
       <pc:docMkLst>
         <pc:docMk/>
       </pc:docMkLst>
@@ -854,7 +854,7 @@
         </pc:spChg>
       </pc:sldChg>
       <pc:sldChg chg="addSp delSp modSp add mod">
-        <pc:chgData name="Thomas Byrne" userId="f88fd6c5ab659097" providerId="LiveId" clId="{C564171C-A25D-42CC-9769-E5B6122DD44C}" dt="2023-12-17T22:48:52.229" v="5298" actId="1036"/>
+        <pc:chgData name="Thomas Byrne" userId="f88fd6c5ab659097" providerId="LiveId" clId="{C564171C-A25D-42CC-9769-E5B6122DD44C}" dt="2023-12-17T23:12:00.511" v="5322" actId="1076"/>
         <pc:sldMkLst>
           <pc:docMk/>
           <pc:sldMk cId="243499396" sldId="272"/>
@@ -891,6 +891,14 @@
             <ac:spMk id="5" creationId="{39892836-5260-47FD-A071-F24EF741D2B8}"/>
           </ac:spMkLst>
         </pc:spChg>
+        <pc:picChg chg="add del mod">
+          <ac:chgData name="Thomas Byrne" userId="f88fd6c5ab659097" providerId="LiveId" clId="{C564171C-A25D-42CC-9769-E5B6122DD44C}" dt="2023-12-17T23:11:28.742" v="5313" actId="478"/>
+          <ac:picMkLst>
+            <pc:docMk/>
+            <pc:sldMk cId="243499396" sldId="272"/>
+            <ac:picMk id="5" creationId="{11B8FE49-BBDC-44D0-AFF7-F2E5A4057844}"/>
+          </ac:picMkLst>
+        </pc:picChg>
         <pc:picChg chg="add mod">
           <ac:chgData name="Thomas Byrne" userId="f88fd6c5ab659097" providerId="LiveId" clId="{C564171C-A25D-42CC-9769-E5B6122DD44C}" dt="2023-12-17T22:48:52.229" v="5298" actId="1036"/>
           <ac:picMkLst>
@@ -900,7 +908,15 @@
           </ac:picMkLst>
         </pc:picChg>
         <pc:picChg chg="add mod">
-          <ac:chgData name="Thomas Byrne" userId="f88fd6c5ab659097" providerId="LiveId" clId="{C564171C-A25D-42CC-9769-E5B6122DD44C}" dt="2023-12-17T22:47:14.109" v="5266" actId="1440"/>
+          <ac:chgData name="Thomas Byrne" userId="f88fd6c5ab659097" providerId="LiveId" clId="{C564171C-A25D-42CC-9769-E5B6122DD44C}" dt="2023-12-17T23:12:00.511" v="5322" actId="1076"/>
+          <ac:picMkLst>
+            <pc:docMk/>
+            <pc:sldMk cId="243499396" sldId="272"/>
+            <ac:picMk id="8" creationId="{EDD4054C-3E97-B711-BF48-7FBFEBD71D13}"/>
+          </ac:picMkLst>
+        </pc:picChg>
+        <pc:picChg chg="add del mod">
+          <ac:chgData name="Thomas Byrne" userId="f88fd6c5ab659097" providerId="LiveId" clId="{C564171C-A25D-42CC-9769-E5B6122DD44C}" dt="2023-12-17T23:11:37.688" v="5316" actId="478"/>
           <ac:picMkLst>
             <pc:docMk/>
             <pc:sldMk cId="243499396" sldId="272"/>
@@ -5722,10 +5738,10 @@
       </p:pic>
       <p:pic>
         <p:nvPicPr>
-          <p:cNvPr id="9" name="Picture 8">
+          <p:cNvPr id="11" name="Picture 10">
             <a:extLst>
               <a:ext uri="{FF2B5EF4-FFF2-40B4-BE49-F238E27FC236}">
-                <a16:creationId xmlns:a16="http://schemas.microsoft.com/office/drawing/2014/main" id="{4BE02BC4-01A9-A76E-52AD-37B3C821A754}"/>
+                <a16:creationId xmlns:a16="http://schemas.microsoft.com/office/drawing/2014/main" id="{0DB75388-D363-EDA1-6964-69EBF47B2395}"/>
               </a:ext>
             </a:extLst>
           </p:cNvPr>
@@ -5742,8 +5758,38 @@
         </p:blipFill>
         <p:spPr>
           <a:xfrm>
-            <a:off x="1401020" y="4603299"/>
-            <a:ext cx="3707693" cy="1331113"/>
+            <a:off x="5520822" y="4969451"/>
+            <a:ext cx="5302251" cy="398222"/>
+          </a:xfrm>
+          <a:prstGeom prst="rect">
+            <a:avLst/>
+          </a:prstGeom>
+        </p:spPr>
+      </p:pic>
+      <p:pic>
+        <p:nvPicPr>
+          <p:cNvPr id="8" name="Picture 7">
+            <a:extLst>
+              <a:ext uri="{FF2B5EF4-FFF2-40B4-BE49-F238E27FC236}">
+                <a16:creationId xmlns:a16="http://schemas.microsoft.com/office/drawing/2014/main" id="{EDD4054C-3E97-B711-BF48-7FBFEBD71D13}"/>
+              </a:ext>
+            </a:extLst>
+          </p:cNvPr>
+          <p:cNvPicPr>
+            <a:picLocks noChangeAspect="1"/>
+          </p:cNvPicPr>
+          <p:nvPr/>
+        </p:nvPicPr>
+        <p:blipFill>
+          <a:blip r:embed="rId5"/>
+          <a:stretch>
+            <a:fillRect/>
+          </a:stretch>
+        </p:blipFill>
+        <p:spPr>
+          <a:xfrm>
+            <a:off x="1368927" y="4685367"/>
+            <a:ext cx="3487995" cy="1364612"/>
           </a:xfrm>
           <a:prstGeom prst="rect">
             <a:avLst/>
@@ -5765,36 +5811,6 @@
           <a:sp3d>
             <a:bevelT w="63500" h="50800"/>
           </a:sp3d>
-        </p:spPr>
-      </p:pic>
-      <p:pic>
-        <p:nvPicPr>
-          <p:cNvPr id="11" name="Picture 10">
-            <a:extLst>
-              <a:ext uri="{FF2B5EF4-FFF2-40B4-BE49-F238E27FC236}">
-                <a16:creationId xmlns:a16="http://schemas.microsoft.com/office/drawing/2014/main" id="{0DB75388-D363-EDA1-6964-69EBF47B2395}"/>
-              </a:ext>
-            </a:extLst>
-          </p:cNvPr>
-          <p:cNvPicPr>
-            <a:picLocks noChangeAspect="1"/>
-          </p:cNvPicPr>
-          <p:nvPr/>
-        </p:nvPicPr>
-        <p:blipFill>
-          <a:blip r:embed="rId5"/>
-          <a:stretch>
-            <a:fillRect/>
-          </a:stretch>
-        </p:blipFill>
-        <p:spPr>
-          <a:xfrm>
-            <a:off x="5520822" y="4969451"/>
-            <a:ext cx="5302251" cy="398222"/>
-          </a:xfrm>
-          <a:prstGeom prst="rect">
-            <a:avLst/>
-          </a:prstGeom>
         </p:spPr>
       </p:pic>
     </p:spTree>

</xml_diff>